<commit_message>
very slight modification to ppt
</commit_message>
<xml_diff>
--- a/graphics pres.pptx
+++ b/graphics pres.pptx
@@ -111,6 +111,11 @@
       </a:defRPr>
     </a:lvl9pPr>
   </p:defaultTextStyle>
+  <p:extLst>
+    <p:ext uri="{EFAFB233-063F-42B5-8137-9DF3F51BA10A}">
+      <p15:sldGuideLst xmlns:p15="http://schemas.microsoft.com/office/powerpoint/2012/main"/>
+    </p:ext>
+  </p:extLst>
 </p:presentation>
 </file>
 
@@ -196,7 +201,7 @@
           <a:p>
             <a:fld id="{9CF2D0E3-95E6-5746-93E0-160C834D63FF}" type="datetimeFigureOut">
               <a:rPr lang="en-US" smtClean="0"/>
-              <a:t>3/7/17</a:t>
+              <a:t>3/8/2017</a:t>
             </a:fld>
             <a:endParaRPr lang="en-US"/>
           </a:p>
@@ -260,38 +265,37 @@
           <a:p>
             <a:pPr lvl="0"/>
             <a:r>
-              <a:rPr lang="en-US" smtClean="0"/>
+              <a:rPr lang="en-US"/>
               <a:t>Click to edit Master text styles</a:t>
             </a:r>
           </a:p>
           <a:p>
             <a:pPr lvl="1"/>
             <a:r>
-              <a:rPr lang="en-US" smtClean="0"/>
+              <a:rPr lang="en-US"/>
               <a:t>Second level</a:t>
             </a:r>
           </a:p>
           <a:p>
             <a:pPr lvl="2"/>
             <a:r>
-              <a:rPr lang="en-US" smtClean="0"/>
+              <a:rPr lang="en-US"/>
               <a:t>Third level</a:t>
             </a:r>
           </a:p>
           <a:p>
             <a:pPr lvl="3"/>
             <a:r>
-              <a:rPr lang="en-US" smtClean="0"/>
+              <a:rPr lang="en-US"/>
               <a:t>Fourth level</a:t>
             </a:r>
           </a:p>
           <a:p>
             <a:pPr lvl="4"/>
             <a:r>
-              <a:rPr lang="en-US" smtClean="0"/>
+              <a:rPr lang="en-US"/>
               <a:t>Fifth level</a:t>
             </a:r>
-            <a:endParaRPr lang="en-US"/>
           </a:p>
         </p:txBody>
       </p:sp>
@@ -509,10 +513,9 @@
           <a:lstStyle/>
           <a:p>
             <a:r>
-              <a:rPr lang="en-US" dirty="0" smtClean="0"/>
+              <a:rPr lang="en-US" dirty="0"/>
               <a:t>Show our demo</a:t>
             </a:r>
-            <a:endParaRPr lang="en-US" dirty="0"/>
           </a:p>
         </p:txBody>
       </p:sp>
@@ -594,10 +597,9 @@
           </a:lstStyle>
           <a:p>
             <a:r>
-              <a:rPr lang="en-US" smtClean="0"/>
+              <a:rPr lang="en-US"/>
               <a:t>Click to edit Master title style</a:t>
             </a:r>
-            <a:endParaRPr lang="en-US"/>
           </a:p>
         </p:txBody>
       </p:sp>
@@ -659,10 +661,9 @@
           </a:lstStyle>
           <a:p>
             <a:r>
-              <a:rPr lang="en-US" smtClean="0"/>
+              <a:rPr lang="en-US"/>
               <a:t>Click to edit Master subtitle style</a:t>
             </a:r>
-            <a:endParaRPr lang="en-US"/>
           </a:p>
         </p:txBody>
       </p:sp>
@@ -683,7 +684,7 @@
           <a:p>
             <a:fld id="{73191279-0B42-3D4D-8144-71DE4B0490B9}" type="datetimeFigureOut">
               <a:rPr lang="en-US" smtClean="0"/>
-              <a:t>3/7/17</a:t>
+              <a:t>3/8/2017</a:t>
             </a:fld>
             <a:endParaRPr lang="en-US"/>
           </a:p>
@@ -777,10 +778,9 @@
           <a:lstStyle/>
           <a:p>
             <a:r>
-              <a:rPr lang="en-US" smtClean="0"/>
+              <a:rPr lang="en-US"/>
               <a:t>Click to edit Master title style</a:t>
             </a:r>
-            <a:endParaRPr lang="en-US"/>
           </a:p>
         </p:txBody>
       </p:sp>
@@ -801,38 +801,37 @@
           <a:p>
             <a:pPr lvl="0"/>
             <a:r>
-              <a:rPr lang="en-US" smtClean="0"/>
+              <a:rPr lang="en-US"/>
               <a:t>Click to edit Master text styles</a:t>
             </a:r>
           </a:p>
           <a:p>
             <a:pPr lvl="1"/>
             <a:r>
-              <a:rPr lang="en-US" smtClean="0"/>
+              <a:rPr lang="en-US"/>
               <a:t>Second level</a:t>
             </a:r>
           </a:p>
           <a:p>
             <a:pPr lvl="2"/>
             <a:r>
-              <a:rPr lang="en-US" smtClean="0"/>
+              <a:rPr lang="en-US"/>
               <a:t>Third level</a:t>
             </a:r>
           </a:p>
           <a:p>
             <a:pPr lvl="3"/>
             <a:r>
-              <a:rPr lang="en-US" smtClean="0"/>
+              <a:rPr lang="en-US"/>
               <a:t>Fourth level</a:t>
             </a:r>
           </a:p>
           <a:p>
             <a:pPr lvl="4"/>
             <a:r>
-              <a:rPr lang="en-US" smtClean="0"/>
+              <a:rPr lang="en-US"/>
               <a:t>Fifth level</a:t>
             </a:r>
-            <a:endParaRPr lang="en-US"/>
           </a:p>
         </p:txBody>
       </p:sp>
@@ -853,7 +852,7 @@
           <a:p>
             <a:fld id="{73191279-0B42-3D4D-8144-71DE4B0490B9}" type="datetimeFigureOut">
               <a:rPr lang="en-US" smtClean="0"/>
-              <a:t>3/7/17</a:t>
+              <a:t>3/8/2017</a:t>
             </a:fld>
             <a:endParaRPr lang="en-US"/>
           </a:p>
@@ -952,10 +951,9 @@
           <a:lstStyle/>
           <a:p>
             <a:r>
-              <a:rPr lang="en-US" smtClean="0"/>
+              <a:rPr lang="en-US"/>
               <a:t>Click to edit Master title style</a:t>
             </a:r>
-            <a:endParaRPr lang="en-US"/>
           </a:p>
         </p:txBody>
       </p:sp>
@@ -981,38 +979,37 @@
           <a:p>
             <a:pPr lvl="0"/>
             <a:r>
-              <a:rPr lang="en-US" smtClean="0"/>
+              <a:rPr lang="en-US"/>
               <a:t>Click to edit Master text styles</a:t>
             </a:r>
           </a:p>
           <a:p>
             <a:pPr lvl="1"/>
             <a:r>
-              <a:rPr lang="en-US" smtClean="0"/>
+              <a:rPr lang="en-US"/>
               <a:t>Second level</a:t>
             </a:r>
           </a:p>
           <a:p>
             <a:pPr lvl="2"/>
             <a:r>
-              <a:rPr lang="en-US" smtClean="0"/>
+              <a:rPr lang="en-US"/>
               <a:t>Third level</a:t>
             </a:r>
           </a:p>
           <a:p>
             <a:pPr lvl="3"/>
             <a:r>
-              <a:rPr lang="en-US" smtClean="0"/>
+              <a:rPr lang="en-US"/>
               <a:t>Fourth level</a:t>
             </a:r>
           </a:p>
           <a:p>
             <a:pPr lvl="4"/>
             <a:r>
-              <a:rPr lang="en-US" smtClean="0"/>
+              <a:rPr lang="en-US"/>
               <a:t>Fifth level</a:t>
             </a:r>
-            <a:endParaRPr lang="en-US"/>
           </a:p>
         </p:txBody>
       </p:sp>
@@ -1033,7 +1030,7 @@
           <a:p>
             <a:fld id="{73191279-0B42-3D4D-8144-71DE4B0490B9}" type="datetimeFigureOut">
               <a:rPr lang="en-US" smtClean="0"/>
-              <a:t>3/7/17</a:t>
+              <a:t>3/8/2017</a:t>
             </a:fld>
             <a:endParaRPr lang="en-US"/>
           </a:p>
@@ -1127,10 +1124,9 @@
           <a:lstStyle/>
           <a:p>
             <a:r>
-              <a:rPr lang="en-US" smtClean="0"/>
+              <a:rPr lang="en-US"/>
               <a:t>Click to edit Master title style</a:t>
             </a:r>
-            <a:endParaRPr lang="en-US"/>
           </a:p>
         </p:txBody>
       </p:sp>
@@ -1151,38 +1147,37 @@
           <a:p>
             <a:pPr lvl="0"/>
             <a:r>
-              <a:rPr lang="en-US" smtClean="0"/>
+              <a:rPr lang="en-US"/>
               <a:t>Click to edit Master text styles</a:t>
             </a:r>
           </a:p>
           <a:p>
             <a:pPr lvl="1"/>
             <a:r>
-              <a:rPr lang="en-US" smtClean="0"/>
+              <a:rPr lang="en-US"/>
               <a:t>Second level</a:t>
             </a:r>
           </a:p>
           <a:p>
             <a:pPr lvl="2"/>
             <a:r>
-              <a:rPr lang="en-US" smtClean="0"/>
+              <a:rPr lang="en-US"/>
               <a:t>Third level</a:t>
             </a:r>
           </a:p>
           <a:p>
             <a:pPr lvl="3"/>
             <a:r>
-              <a:rPr lang="en-US" smtClean="0"/>
+              <a:rPr lang="en-US"/>
               <a:t>Fourth level</a:t>
             </a:r>
           </a:p>
           <a:p>
             <a:pPr lvl="4"/>
             <a:r>
-              <a:rPr lang="en-US" smtClean="0"/>
+              <a:rPr lang="en-US"/>
               <a:t>Fifth level</a:t>
             </a:r>
-            <a:endParaRPr lang="en-US"/>
           </a:p>
         </p:txBody>
       </p:sp>
@@ -1203,7 +1198,7 @@
           <a:p>
             <a:fld id="{73191279-0B42-3D4D-8144-71DE4B0490B9}" type="datetimeFigureOut">
               <a:rPr lang="en-US" smtClean="0"/>
-              <a:t>3/7/17</a:t>
+              <a:t>3/8/2017</a:t>
             </a:fld>
             <a:endParaRPr lang="en-US"/>
           </a:p>
@@ -1306,10 +1301,9 @@
           </a:lstStyle>
           <a:p>
             <a:r>
-              <a:rPr lang="en-US" smtClean="0"/>
+              <a:rPr lang="en-US"/>
               <a:t>Click to edit Master title style</a:t>
             </a:r>
-            <a:endParaRPr lang="en-US"/>
           </a:p>
         </p:txBody>
       </p:sp>
@@ -1426,7 +1420,7 @@
           <a:p>
             <a:pPr lvl="0"/>
             <a:r>
-              <a:rPr lang="en-US" smtClean="0"/>
+              <a:rPr lang="en-US"/>
               <a:t>Click to edit Master text styles</a:t>
             </a:r>
           </a:p>
@@ -1449,7 +1443,7 @@
           <a:p>
             <a:fld id="{73191279-0B42-3D4D-8144-71DE4B0490B9}" type="datetimeFigureOut">
               <a:rPr lang="en-US" smtClean="0"/>
-              <a:t>3/7/17</a:t>
+              <a:t>3/8/2017</a:t>
             </a:fld>
             <a:endParaRPr lang="en-US"/>
           </a:p>
@@ -1543,10 +1537,9 @@
           <a:lstStyle/>
           <a:p>
             <a:r>
-              <a:rPr lang="en-US" smtClean="0"/>
+              <a:rPr lang="en-US"/>
               <a:t>Click to edit Master title style</a:t>
             </a:r>
-            <a:endParaRPr lang="en-US"/>
           </a:p>
         </p:txBody>
       </p:sp>
@@ -1572,38 +1565,37 @@
           <a:p>
             <a:pPr lvl="0"/>
             <a:r>
-              <a:rPr lang="en-US" smtClean="0"/>
+              <a:rPr lang="en-US"/>
               <a:t>Click to edit Master text styles</a:t>
             </a:r>
           </a:p>
           <a:p>
             <a:pPr lvl="1"/>
             <a:r>
-              <a:rPr lang="en-US" smtClean="0"/>
+              <a:rPr lang="en-US"/>
               <a:t>Second level</a:t>
             </a:r>
           </a:p>
           <a:p>
             <a:pPr lvl="2"/>
             <a:r>
-              <a:rPr lang="en-US" smtClean="0"/>
+              <a:rPr lang="en-US"/>
               <a:t>Third level</a:t>
             </a:r>
           </a:p>
           <a:p>
             <a:pPr lvl="3"/>
             <a:r>
-              <a:rPr lang="en-US" smtClean="0"/>
+              <a:rPr lang="en-US"/>
               <a:t>Fourth level</a:t>
             </a:r>
           </a:p>
           <a:p>
             <a:pPr lvl="4"/>
             <a:r>
-              <a:rPr lang="en-US" smtClean="0"/>
+              <a:rPr lang="en-US"/>
               <a:t>Fifth level</a:t>
             </a:r>
-            <a:endParaRPr lang="en-US"/>
           </a:p>
         </p:txBody>
       </p:sp>
@@ -1629,38 +1621,37 @@
           <a:p>
             <a:pPr lvl="0"/>
             <a:r>
-              <a:rPr lang="en-US" smtClean="0"/>
+              <a:rPr lang="en-US"/>
               <a:t>Click to edit Master text styles</a:t>
             </a:r>
           </a:p>
           <a:p>
             <a:pPr lvl="1"/>
             <a:r>
-              <a:rPr lang="en-US" smtClean="0"/>
+              <a:rPr lang="en-US"/>
               <a:t>Second level</a:t>
             </a:r>
           </a:p>
           <a:p>
             <a:pPr lvl="2"/>
             <a:r>
-              <a:rPr lang="en-US" smtClean="0"/>
+              <a:rPr lang="en-US"/>
               <a:t>Third level</a:t>
             </a:r>
           </a:p>
           <a:p>
             <a:pPr lvl="3"/>
             <a:r>
-              <a:rPr lang="en-US" smtClean="0"/>
+              <a:rPr lang="en-US"/>
               <a:t>Fourth level</a:t>
             </a:r>
           </a:p>
           <a:p>
             <a:pPr lvl="4"/>
             <a:r>
-              <a:rPr lang="en-US" smtClean="0"/>
+              <a:rPr lang="en-US"/>
               <a:t>Fifth level</a:t>
             </a:r>
-            <a:endParaRPr lang="en-US"/>
           </a:p>
         </p:txBody>
       </p:sp>
@@ -1681,7 +1672,7 @@
           <a:p>
             <a:fld id="{73191279-0B42-3D4D-8144-71DE4B0490B9}" type="datetimeFigureOut">
               <a:rPr lang="en-US" smtClean="0"/>
-              <a:t>3/7/17</a:t>
+              <a:t>3/8/2017</a:t>
             </a:fld>
             <a:endParaRPr lang="en-US"/>
           </a:p>
@@ -1780,10 +1771,9 @@
           <a:lstStyle/>
           <a:p>
             <a:r>
-              <a:rPr lang="en-US" smtClean="0"/>
+              <a:rPr lang="en-US"/>
               <a:t>Click to edit Master title style</a:t>
             </a:r>
-            <a:endParaRPr lang="en-US"/>
           </a:p>
         </p:txBody>
       </p:sp>
@@ -1846,7 +1836,7 @@
           <a:p>
             <a:pPr lvl="0"/>
             <a:r>
-              <a:rPr lang="en-US" smtClean="0"/>
+              <a:rPr lang="en-US"/>
               <a:t>Click to edit Master text styles</a:t>
             </a:r>
           </a:p>
@@ -1874,38 +1864,37 @@
           <a:p>
             <a:pPr lvl="0"/>
             <a:r>
-              <a:rPr lang="en-US" smtClean="0"/>
+              <a:rPr lang="en-US"/>
               <a:t>Click to edit Master text styles</a:t>
             </a:r>
           </a:p>
           <a:p>
             <a:pPr lvl="1"/>
             <a:r>
-              <a:rPr lang="en-US" smtClean="0"/>
+              <a:rPr lang="en-US"/>
               <a:t>Second level</a:t>
             </a:r>
           </a:p>
           <a:p>
             <a:pPr lvl="2"/>
             <a:r>
-              <a:rPr lang="en-US" smtClean="0"/>
+              <a:rPr lang="en-US"/>
               <a:t>Third level</a:t>
             </a:r>
           </a:p>
           <a:p>
             <a:pPr lvl="3"/>
             <a:r>
-              <a:rPr lang="en-US" smtClean="0"/>
+              <a:rPr lang="en-US"/>
               <a:t>Fourth level</a:t>
             </a:r>
           </a:p>
           <a:p>
             <a:pPr lvl="4"/>
             <a:r>
-              <a:rPr lang="en-US" smtClean="0"/>
+              <a:rPr lang="en-US"/>
               <a:t>Fifth level</a:t>
             </a:r>
-            <a:endParaRPr lang="en-US"/>
           </a:p>
         </p:txBody>
       </p:sp>
@@ -1968,7 +1957,7 @@
           <a:p>
             <a:pPr lvl="0"/>
             <a:r>
-              <a:rPr lang="en-US" smtClean="0"/>
+              <a:rPr lang="en-US"/>
               <a:t>Click to edit Master text styles</a:t>
             </a:r>
           </a:p>
@@ -1996,38 +1985,37 @@
           <a:p>
             <a:pPr lvl="0"/>
             <a:r>
-              <a:rPr lang="en-US" smtClean="0"/>
+              <a:rPr lang="en-US"/>
               <a:t>Click to edit Master text styles</a:t>
             </a:r>
           </a:p>
           <a:p>
             <a:pPr lvl="1"/>
             <a:r>
-              <a:rPr lang="en-US" smtClean="0"/>
+              <a:rPr lang="en-US"/>
               <a:t>Second level</a:t>
             </a:r>
           </a:p>
           <a:p>
             <a:pPr lvl="2"/>
             <a:r>
-              <a:rPr lang="en-US" smtClean="0"/>
+              <a:rPr lang="en-US"/>
               <a:t>Third level</a:t>
             </a:r>
           </a:p>
           <a:p>
             <a:pPr lvl="3"/>
             <a:r>
-              <a:rPr lang="en-US" smtClean="0"/>
+              <a:rPr lang="en-US"/>
               <a:t>Fourth level</a:t>
             </a:r>
           </a:p>
           <a:p>
             <a:pPr lvl="4"/>
             <a:r>
-              <a:rPr lang="en-US" smtClean="0"/>
+              <a:rPr lang="en-US"/>
               <a:t>Fifth level</a:t>
             </a:r>
-            <a:endParaRPr lang="en-US"/>
           </a:p>
         </p:txBody>
       </p:sp>
@@ -2048,7 +2036,7 @@
           <a:p>
             <a:fld id="{73191279-0B42-3D4D-8144-71DE4B0490B9}" type="datetimeFigureOut">
               <a:rPr lang="en-US" smtClean="0"/>
-              <a:t>3/7/17</a:t>
+              <a:t>3/8/2017</a:t>
             </a:fld>
             <a:endParaRPr lang="en-US"/>
           </a:p>
@@ -2142,10 +2130,9 @@
           <a:lstStyle/>
           <a:p>
             <a:r>
-              <a:rPr lang="en-US" smtClean="0"/>
+              <a:rPr lang="en-US"/>
               <a:t>Click to edit Master title style</a:t>
             </a:r>
-            <a:endParaRPr lang="en-US"/>
           </a:p>
         </p:txBody>
       </p:sp>
@@ -2166,7 +2153,7 @@
           <a:p>
             <a:fld id="{73191279-0B42-3D4D-8144-71DE4B0490B9}" type="datetimeFigureOut">
               <a:rPr lang="en-US" smtClean="0"/>
-              <a:t>3/7/17</a:t>
+              <a:t>3/8/2017</a:t>
             </a:fld>
             <a:endParaRPr lang="en-US"/>
           </a:p>
@@ -2261,7 +2248,7 @@
           <a:p>
             <a:fld id="{73191279-0B42-3D4D-8144-71DE4B0490B9}" type="datetimeFigureOut">
               <a:rPr lang="en-US" smtClean="0"/>
-              <a:t>3/7/17</a:t>
+              <a:t>3/8/2017</a:t>
             </a:fld>
             <a:endParaRPr lang="en-US"/>
           </a:p>
@@ -2364,10 +2351,9 @@
           </a:lstStyle>
           <a:p>
             <a:r>
-              <a:rPr lang="en-US" smtClean="0"/>
+              <a:rPr lang="en-US"/>
               <a:t>Click to edit Master title style</a:t>
             </a:r>
-            <a:endParaRPr lang="en-US"/>
           </a:p>
         </p:txBody>
       </p:sp>
@@ -2421,38 +2407,37 @@
           <a:p>
             <a:pPr lvl="0"/>
             <a:r>
-              <a:rPr lang="en-US" smtClean="0"/>
+              <a:rPr lang="en-US"/>
               <a:t>Click to edit Master text styles</a:t>
             </a:r>
           </a:p>
           <a:p>
             <a:pPr lvl="1"/>
             <a:r>
-              <a:rPr lang="en-US" smtClean="0"/>
+              <a:rPr lang="en-US"/>
               <a:t>Second level</a:t>
             </a:r>
           </a:p>
           <a:p>
             <a:pPr lvl="2"/>
             <a:r>
-              <a:rPr lang="en-US" smtClean="0"/>
+              <a:rPr lang="en-US"/>
               <a:t>Third level</a:t>
             </a:r>
           </a:p>
           <a:p>
             <a:pPr lvl="3"/>
             <a:r>
-              <a:rPr lang="en-US" smtClean="0"/>
+              <a:rPr lang="en-US"/>
               <a:t>Fourth level</a:t>
             </a:r>
           </a:p>
           <a:p>
             <a:pPr lvl="4"/>
             <a:r>
-              <a:rPr lang="en-US" smtClean="0"/>
+              <a:rPr lang="en-US"/>
               <a:t>Fifth level</a:t>
             </a:r>
-            <a:endParaRPr lang="en-US"/>
           </a:p>
         </p:txBody>
       </p:sp>
@@ -2515,7 +2500,7 @@
           <a:p>
             <a:pPr lvl="0"/>
             <a:r>
-              <a:rPr lang="en-US" smtClean="0"/>
+              <a:rPr lang="en-US"/>
               <a:t>Click to edit Master text styles</a:t>
             </a:r>
           </a:p>
@@ -2538,7 +2523,7 @@
           <a:p>
             <a:fld id="{73191279-0B42-3D4D-8144-71DE4B0490B9}" type="datetimeFigureOut">
               <a:rPr lang="en-US" smtClean="0"/>
-              <a:t>3/7/17</a:t>
+              <a:t>3/8/2017</a:t>
             </a:fld>
             <a:endParaRPr lang="en-US"/>
           </a:p>
@@ -2641,10 +2626,9 @@
           </a:lstStyle>
           <a:p>
             <a:r>
-              <a:rPr lang="en-US" smtClean="0"/>
+              <a:rPr lang="en-US"/>
               <a:t>Click to edit Master title style</a:t>
             </a:r>
-            <a:endParaRPr lang="en-US"/>
           </a:p>
         </p:txBody>
       </p:sp>
@@ -2768,7 +2752,7 @@
           <a:p>
             <a:pPr lvl="0"/>
             <a:r>
-              <a:rPr lang="en-US" smtClean="0"/>
+              <a:rPr lang="en-US"/>
               <a:t>Click to edit Master text styles</a:t>
             </a:r>
           </a:p>
@@ -2791,7 +2775,7 @@
           <a:p>
             <a:fld id="{73191279-0B42-3D4D-8144-71DE4B0490B9}" type="datetimeFigureOut">
               <a:rPr lang="en-US" smtClean="0"/>
-              <a:t>3/7/17</a:t>
+              <a:t>3/8/2017</a:t>
             </a:fld>
             <a:endParaRPr lang="en-US"/>
           </a:p>
@@ -2900,10 +2884,9 @@
           <a:lstStyle/>
           <a:p>
             <a:r>
-              <a:rPr lang="en-US" smtClean="0"/>
+              <a:rPr lang="en-US"/>
               <a:t>Click to edit Master title style</a:t>
             </a:r>
-            <a:endParaRPr lang="en-US"/>
           </a:p>
         </p:txBody>
       </p:sp>
@@ -2934,38 +2917,37 @@
           <a:p>
             <a:pPr lvl="0"/>
             <a:r>
-              <a:rPr lang="en-US" smtClean="0"/>
+              <a:rPr lang="en-US"/>
               <a:t>Click to edit Master text styles</a:t>
             </a:r>
           </a:p>
           <a:p>
             <a:pPr lvl="1"/>
             <a:r>
-              <a:rPr lang="en-US" smtClean="0"/>
+              <a:rPr lang="en-US"/>
               <a:t>Second level</a:t>
             </a:r>
           </a:p>
           <a:p>
             <a:pPr lvl="2"/>
             <a:r>
-              <a:rPr lang="en-US" smtClean="0"/>
+              <a:rPr lang="en-US"/>
               <a:t>Third level</a:t>
             </a:r>
           </a:p>
           <a:p>
             <a:pPr lvl="3"/>
             <a:r>
-              <a:rPr lang="en-US" smtClean="0"/>
+              <a:rPr lang="en-US"/>
               <a:t>Fourth level</a:t>
             </a:r>
           </a:p>
           <a:p>
             <a:pPr lvl="4"/>
             <a:r>
-              <a:rPr lang="en-US" smtClean="0"/>
+              <a:rPr lang="en-US"/>
               <a:t>Fifth level</a:t>
             </a:r>
-            <a:endParaRPr lang="en-US"/>
           </a:p>
         </p:txBody>
       </p:sp>
@@ -3004,7 +2986,7 @@
           <a:p>
             <a:fld id="{73191279-0B42-3D4D-8144-71DE4B0490B9}" type="datetimeFigureOut">
               <a:rPr lang="en-US" smtClean="0"/>
-              <a:t>3/7/17</a:t>
+              <a:t>3/8/2017</a:t>
             </a:fld>
             <a:endParaRPr lang="en-US"/>
           </a:p>
@@ -3427,11 +3409,11 @@
           <a:lstStyle/>
           <a:p>
             <a:r>
-              <a:rPr lang="en-US" dirty="0" smtClean="0"/>
+              <a:rPr lang="en-US" dirty="0"/>
               <a:t>Physics in Computer Graphics</a:t>
             </a:r>
             <a:br>
-              <a:rPr lang="en-US" dirty="0" smtClean="0"/>
+              <a:rPr lang="en-US" dirty="0"/>
             </a:br>
             <a:endParaRPr lang="en-US" dirty="0"/>
           </a:p>
@@ -3453,15 +3435,15 @@
           <a:lstStyle/>
           <a:p>
             <a:r>
-              <a:rPr lang="en-US" dirty="0" err="1" smtClean="0"/>
+              <a:rPr lang="en-US" dirty="0" err="1"/>
               <a:t>Ju</a:t>
             </a:r>
             <a:r>
-              <a:rPr lang="en-US" dirty="0" smtClean="0"/>
+              <a:rPr lang="en-US" dirty="0"/>
               <a:t> Yun Kim and Dmitry </a:t>
             </a:r>
             <a:r>
-              <a:rPr lang="en-US" dirty="0" err="1" smtClean="0"/>
+              <a:rPr lang="en-US" dirty="0" err="1"/>
               <a:t>Tensyn</a:t>
             </a:r>
             <a:endParaRPr lang="en-US" dirty="0"/>
@@ -3478,13 +3460,6 @@
   <p:clrMapOvr>
     <a:masterClrMapping/>
   </p:clrMapOvr>
-  <p:timing>
-    <p:tnLst>
-      <p:par>
-        <p:cTn id="1" dur="indefinite" restart="never" nodeType="tmRoot"/>
-      </p:par>
-    </p:tnLst>
-  </p:timing>
 </p:sld>
 </file>
 
@@ -3544,13 +3519,6 @@
   <p:clrMapOvr>
     <a:masterClrMapping/>
   </p:clrMapOvr>
-  <p:timing>
-    <p:tnLst>
-      <p:par>
-        <p:cTn id="1" dur="indefinite" restart="never" nodeType="tmRoot"/>
-      </p:par>
-    </p:tnLst>
-  </p:timing>
 </p:sld>
 </file>
 
@@ -3587,10 +3555,9 @@
           <a:lstStyle/>
           <a:p>
             <a:r>
-              <a:rPr lang="en-US" dirty="0" smtClean="0"/>
+              <a:rPr lang="en-US" dirty="0"/>
               <a:t>Data Types</a:t>
             </a:r>
-            <a:endParaRPr lang="en-US" dirty="0"/>
           </a:p>
         </p:txBody>
       </p:sp>
@@ -3610,37 +3577,29 @@
           <a:lstStyle/>
           <a:p>
             <a:r>
-              <a:rPr lang="en-US" dirty="0" smtClean="0"/>
+              <a:rPr lang="en-US" dirty="0"/>
               <a:t>Dynamic Bodies – abstracted physical objects</a:t>
             </a:r>
           </a:p>
           <a:p>
             <a:r>
-              <a:rPr lang="en-US" dirty="0" err="1" smtClean="0"/>
+              <a:rPr lang="en-US" dirty="0" err="1"/>
               <a:t>Geom</a:t>
             </a:r>
             <a:r>
-              <a:rPr lang="en-US" dirty="0" smtClean="0"/>
-              <a:t> Bodies – geometric </a:t>
-            </a:r>
-            <a:r>
-              <a:rPr lang="en-US" dirty="0" err="1" smtClean="0"/>
-              <a:t>meshs</a:t>
-            </a:r>
-            <a:r>
-              <a:rPr lang="en-US" dirty="0" smtClean="0"/>
-              <a:t> for collision detection</a:t>
+              <a:rPr lang="en-US" dirty="0"/>
+              <a:t> Bodies – geometric meshes for collision detection</a:t>
             </a:r>
           </a:p>
           <a:p>
             <a:pPr lvl="1"/>
             <a:r>
-              <a:rPr lang="en-US" dirty="0" err="1" smtClean="0"/>
+              <a:rPr lang="en-US" dirty="0" err="1"/>
               <a:t>Trimesh</a:t>
             </a:r>
             <a:r>
-              <a:rPr lang="en-US" dirty="0" smtClean="0"/>
-              <a:t> class – useful for the kind of meshes that we have</a:t>
+              <a:rPr lang="en-US" dirty="0"/>
+              <a:t> class – useful for complex meshes </a:t>
             </a:r>
           </a:p>
           <a:p>
@@ -3659,13 +3618,6 @@
   <p:clrMapOvr>
     <a:masterClrMapping/>
   </p:clrMapOvr>
-  <p:timing>
-    <p:tnLst>
-      <p:par>
-        <p:cTn id="1" dur="indefinite" restart="never" nodeType="tmRoot"/>
-      </p:par>
-    </p:tnLst>
-  </p:timing>
 </p:sld>
 </file>
 
@@ -3725,13 +3677,6 @@
   <p:clrMapOvr>
     <a:masterClrMapping/>
   </p:clrMapOvr>
-  <p:timing>
-    <p:tnLst>
-      <p:par>
-        <p:cTn id="1" dur="indefinite" restart="never" nodeType="tmRoot"/>
-      </p:par>
-    </p:tnLst>
-  </p:timing>
 </p:sld>
 </file>
 
@@ -3768,11 +3713,11 @@
           <a:lstStyle/>
           <a:p>
             <a:r>
-              <a:rPr lang="en-US" dirty="0" smtClean="0"/>
+              <a:rPr lang="en-US" dirty="0"/>
               <a:t>For the time being</a:t>
             </a:r>
             <a:r>
-              <a:rPr lang="is-IS" dirty="0" smtClean="0"/>
+              <a:rPr lang="is-IS" dirty="0"/>
               <a:t>…</a:t>
             </a:r>
             <a:endParaRPr lang="en-US" dirty="0"/>
@@ -3808,13 +3753,6 @@
   <p:clrMapOvr>
     <a:masterClrMapping/>
   </p:clrMapOvr>
-  <p:timing>
-    <p:tnLst>
-      <p:par>
-        <p:cTn id="1" dur="indefinite" restart="never" nodeType="tmRoot"/>
-      </p:par>
-    </p:tnLst>
-  </p:timing>
 </p:sld>
 </file>
 

</xml_diff>